<commit_message>
Removed logo from slides
</commit_message>
<xml_diff>
--- a/downstream_analysis_r/files/MetaPathways_Tutorial_Downstream_Analysis_R.pptx
+++ b/downstream_analysis_r/files/MetaPathways_Tutorial_Downstream_Analysis_R.pptx
@@ -13938,7 +13938,7 @@
       </p:grpSpPr>
       <p:pic>
         <p:nvPicPr>
-          <p:cNvPr id="8" name="Picture 7" descr="IGEM_Calgary_Gebome_Alberta_Logo.png"/>
+          <p:cNvPr id="9" name="Picture 8" descr="pathway_tools_page_no.png"/>
           <p:cNvPicPr>
             <a:picLocks noChangeAspect="1"/>
           </p:cNvPicPr>
@@ -13946,36 +13946,6 @@
         </p:nvPicPr>
         <p:blipFill>
           <a:blip r:embed="rId24">
-            <a:extLst>
-              <a:ext uri="{28A0092B-C50C-407E-A947-70E740481C1C}">
-                <a14:useLocalDpi xmlns:a14="http://schemas.microsoft.com/office/drawing/2010/main" val="0"/>
-              </a:ext>
-            </a:extLst>
-          </a:blip>
-          <a:stretch>
-            <a:fillRect/>
-          </a:stretch>
-        </p:blipFill>
-        <p:spPr>
-          <a:xfrm>
-            <a:off x="134007" y="5890941"/>
-            <a:ext cx="1259162" cy="829272"/>
-          </a:xfrm>
-          <a:prstGeom prst="rect">
-            <a:avLst/>
-          </a:prstGeom>
-        </p:spPr>
-      </p:pic>
-      <p:pic>
-        <p:nvPicPr>
-          <p:cNvPr id="9" name="Picture 8" descr="pathway_tools_page_no.png"/>
-          <p:cNvPicPr>
-            <a:picLocks noChangeAspect="1"/>
-          </p:cNvPicPr>
-          <p:nvPr userDrawn="1"/>
-        </p:nvPicPr>
-        <p:blipFill>
-          <a:blip r:embed="rId25">
             <a:extLst>
               <a:ext uri="{28A0092B-C50C-407E-A947-70E740481C1C}">
                 <a14:useLocalDpi xmlns:a14="http://schemas.microsoft.com/office/drawing/2010/main" val="0"/>

</xml_diff>